<commit_message>
Adding readable and writable examples
</commit_message>
<xml_diff>
--- a/nodedublin.pptx
+++ b/nodedublin.pptx
@@ -1339,14 +1339,6 @@
             </a:r>
             <a:r>
               <a:rPr lang="en-US" baseline="0" dirty="0" smtClean="0"/>
-              <a:t> or </a:t>
-            </a:r>
-            <a:r>
-              <a:rPr lang="en-US" baseline="0" dirty="0" err="1" smtClean="0"/>
-              <a:t>net.connect</a:t>
-            </a:r>
-            <a:r>
-              <a:rPr lang="en-US" baseline="0" dirty="0" smtClean="0"/>
               <a:t> as your friend with read streams, </a:t>
             </a:r>
           </a:p>
@@ -1358,6 +1350,17 @@
               <a:rPr lang="en-US" baseline="0" dirty="0" smtClean="0"/>
               <a:t>To create your own is quite easy by simply creating a new stream, and setting the readable property to true.  In this case, we’ll emit data 5 times and then end, pausing 1 second in between.  </a:t>
             </a:r>
+          </a:p>
+          <a:p>
+            <a:endParaRPr lang="en-US" baseline="0" dirty="0" smtClean="0"/>
+          </a:p>
+          <a:p>
+            <a:r>
+              <a:rPr lang="en-US" baseline="0" dirty="0" smtClean="0"/>
+              <a:t>Let’s walk through a few examples of using read streams:</a:t>
+            </a:r>
+          </a:p>
+          <a:p>
             <a:endParaRPr lang="en-US" dirty="0"/>
           </a:p>
         </p:txBody>
@@ -1449,7 +1452,7 @@
             </a:r>
             <a:r>
               <a:rPr lang="en-US" baseline="0" dirty="0" smtClean="0"/>
-              <a:t> is a writable stream.  You’ll not this time we have methods to write and end, which of course correspond to our </a:t>
+              <a:t> is a writable stream.  You’ll note this time we have methods to write and end, which of course correspond to our </a:t>
             </a:r>
             <a:r>
               <a:rPr lang="en-US" baseline="0" dirty="0" err="1" smtClean="0"/>
@@ -1468,6 +1471,17 @@
               <a:rPr lang="en-US" baseline="0" dirty="0" smtClean="0"/>
               <a:t>In this little example, we have a stream where the writable is now true, and then we implement a write method, the end method and destroy.  The end might look interesting as we’re getting data.  In Node core, it’s common place for end to take data as a one and done operation, so for consistency sake it’s good to have it in there.  And for destroy, we ensure that our stream is no longer writeable, in the case of errors, etc.</a:t>
             </a:r>
+          </a:p>
+          <a:p>
+            <a:endParaRPr lang="en-US" baseline="0" dirty="0" smtClean="0"/>
+          </a:p>
+          <a:p>
+            <a:r>
+              <a:rPr lang="en-US" baseline="0" dirty="0" smtClean="0"/>
+              <a:t>Let’s go through a few examples of using write streams:</a:t>
+            </a:r>
+          </a:p>
+          <a:p>
             <a:endParaRPr lang="en-US" dirty="0"/>
           </a:p>
         </p:txBody>
@@ -1873,6 +1887,15 @@
               <a:rPr lang="en-US" baseline="0" dirty="0" smtClean="0"/>
               <a:t> are a lot of awesome modules in here, but the through module in particular from Dominic Tarr is great as a toolkit for creating through streams.</a:t>
             </a:r>
+          </a:p>
+          <a:p>
+            <a:endParaRPr lang="en-US" baseline="0" dirty="0" smtClean="0"/>
+          </a:p>
+          <a:p>
+            <a:r>
+              <a:rPr lang="en-US" baseline="0" dirty="0" smtClean="0"/>
+              <a:t>Here are some examples.</a:t>
+            </a:r>
             <a:endParaRPr lang="en-US" dirty="0"/>
           </a:p>
         </p:txBody>
@@ -2255,13 +2278,7 @@
               <a:rPr lang="en-US" dirty="0" smtClean="0">
                 <a:hlinkClick r:id="rId7"/>
               </a:rPr>
-              <a:t>https</a:t>
-            </a:r>
-            <a:r>
-              <a:rPr lang="en-US" dirty="0" smtClean="0">
-                <a:hlinkClick r:id="rId7"/>
-              </a:rPr>
-              <a:t>://npmjs.org/package/shoe</a:t>
+              <a:t>https://github.com/substack/shoe</a:t>
             </a:r>
             <a:endParaRPr lang="en-US" dirty="0" smtClean="0"/>
           </a:p>
@@ -2270,7 +2287,7 @@
               <a:rPr lang="en-US" dirty="0" smtClean="0">
                 <a:hlinkClick r:id="rId8"/>
               </a:rPr>
-              <a:t>https://npmjs.org/package/pause-stream</a:t>
+              <a:t>https://github.com/dominictarr/pause-stream</a:t>
             </a:r>
             <a:endParaRPr lang="en-US" dirty="0" smtClean="0"/>
           </a:p>
@@ -2279,7 +2296,7 @@
               <a:rPr lang="en-US" dirty="0" smtClean="0">
                 <a:hlinkClick r:id="rId9"/>
               </a:rPr>
-              <a:t>https://npmjs.org/package/through</a:t>
+              <a:t>https://github.com/dominictarr/through</a:t>
             </a:r>
             <a:endParaRPr lang="en-US" dirty="0" smtClean="0"/>
           </a:p>
@@ -2288,7 +2305,7 @@
               <a:rPr lang="en-US" dirty="0" smtClean="0">
                 <a:hlinkClick r:id="rId10"/>
               </a:rPr>
-              <a:t>https://npmjs.org/package/scuttlebutt</a:t>
+              <a:t>https://github.com/dominictarr/scuttlebutt</a:t>
             </a:r>
             <a:endParaRPr lang="en-US" dirty="0" smtClean="0"/>
           </a:p>
@@ -2297,7 +2314,7 @@
               <a:rPr lang="en-US" dirty="0" smtClean="0">
                 <a:hlinkClick r:id="rId11"/>
               </a:rPr>
-              <a:t>https://npmjs.org/package/tar</a:t>
+              <a:t>https://github.com/isaacs/node-tar</a:t>
             </a:r>
             <a:endParaRPr lang="en-US" dirty="0" smtClean="0"/>
           </a:p>
@@ -2306,11 +2323,17 @@
               <a:rPr lang="en-US" dirty="0" smtClean="0">
                 <a:hlinkClick r:id="rId12"/>
               </a:rPr>
-              <a:t>https://npmjs.org/package/dnode</a:t>
+              <a:t>https://github.com/substack/dnode</a:t>
             </a:r>
             <a:endParaRPr lang="en-US" dirty="0" smtClean="0"/>
           </a:p>
           <a:p>
+            <a:r>
+              <a:rPr lang="en-US" dirty="0" smtClean="0">
+                <a:hlinkClick r:id="rId13"/>
+              </a:rPr>
+              <a:t>https://github.com/substack/emit-stream</a:t>
+            </a:r>
             <a:endParaRPr lang="en-US" dirty="0"/>
           </a:p>
         </p:txBody>
@@ -2498,6 +2521,114 @@
             <a:endParaRPr lang="en-US" baseline="0" dirty="0" smtClean="0"/>
           </a:p>
           <a:p>
+            <a:pPr marL="228600" indent="-228600">
+              <a:buFont typeface="+mj-lt"/>
+              <a:buAutoNum type="arabicPeriod"/>
+            </a:pPr>
+            <a:r>
+              <a:rPr lang="en-US" sz="1200" b="0" i="0" kern="1200" dirty="0" smtClean="0">
+                <a:solidFill>
+                  <a:schemeClr val="tx1"/>
+                </a:solidFill>
+                <a:effectLst/>
+                <a:latin typeface="+mn-lt"/>
+                <a:ea typeface="+mn-ea"/>
+                <a:cs typeface="+mn-cs"/>
+              </a:rPr>
+              <a:t>The data events start coming right away, no matter what. There is no way to do other actions before consuming data, without handling buffering yourself.</a:t>
+            </a:r>
+          </a:p>
+          <a:p>
+            <a:pPr marL="228600" indent="-228600">
+              <a:buFont typeface="+mj-lt"/>
+              <a:buAutoNum type="arabicPeriod"/>
+            </a:pPr>
+            <a:r>
+              <a:rPr lang="en-US" sz="1200" b="0" i="0" kern="1200" dirty="0" smtClean="0">
+                <a:solidFill>
+                  <a:schemeClr val="tx1"/>
+                </a:solidFill>
+                <a:effectLst/>
+                <a:latin typeface="+mn-lt"/>
+                <a:ea typeface="+mn-ea"/>
+                <a:cs typeface="+mn-cs"/>
+              </a:rPr>
+              <a:t>If you extend the interface in </a:t>
+            </a:r>
+            <a:r>
+              <a:rPr lang="en-US" sz="1200" b="0" i="0" kern="1200" dirty="0" err="1" smtClean="0">
+                <a:solidFill>
+                  <a:schemeClr val="tx1"/>
+                </a:solidFill>
+                <a:effectLst/>
+                <a:latin typeface="+mn-lt"/>
+                <a:ea typeface="+mn-ea"/>
+                <a:cs typeface="+mn-cs"/>
+              </a:rPr>
+              <a:t>userland</a:t>
+            </a:r>
+            <a:r>
+              <a:rPr lang="en-US" sz="1200" b="0" i="0" kern="1200" dirty="0" smtClean="0">
+                <a:solidFill>
+                  <a:schemeClr val="tx1"/>
+                </a:solidFill>
+                <a:effectLst/>
+                <a:latin typeface="+mn-lt"/>
+                <a:ea typeface="+mn-ea"/>
+                <a:cs typeface="+mn-cs"/>
+              </a:rPr>
+              <a:t> programs, then you must implement pause() and resume() methods, and take care of buffering yourself.</a:t>
+            </a:r>
+          </a:p>
+          <a:p>
+            <a:pPr marL="228600" indent="-228600">
+              <a:buFont typeface="+mj-lt"/>
+              <a:buAutoNum type="arabicPeriod"/>
+            </a:pPr>
+            <a:r>
+              <a:rPr lang="en-US" sz="1200" b="0" i="0" kern="1200" dirty="0" smtClean="0">
+                <a:solidFill>
+                  <a:schemeClr val="tx1"/>
+                </a:solidFill>
+                <a:effectLst/>
+                <a:latin typeface="+mn-lt"/>
+                <a:ea typeface="+mn-ea"/>
+                <a:cs typeface="+mn-cs"/>
+              </a:rPr>
+              <a:t>In many streams, pause() was purely advisory, so </a:t>
+            </a:r>
+            <a:r>
+              <a:rPr lang="en-US" sz="1200" b="1" i="0" kern="1200" dirty="0" smtClean="0">
+                <a:solidFill>
+                  <a:schemeClr val="tx1"/>
+                </a:solidFill>
+                <a:effectLst/>
+                <a:latin typeface="+mn-lt"/>
+                <a:ea typeface="+mn-ea"/>
+                <a:cs typeface="+mn-cs"/>
+              </a:rPr>
+              <a:t>even while paused</a:t>
+            </a:r>
+            <a:r>
+              <a:rPr lang="en-US" sz="1200" b="0" i="0" kern="1200" dirty="0" smtClean="0">
+                <a:solidFill>
+                  <a:schemeClr val="tx1"/>
+                </a:solidFill>
+                <a:effectLst/>
+                <a:latin typeface="+mn-lt"/>
+                <a:ea typeface="+mn-ea"/>
+                <a:cs typeface="+mn-cs"/>
+              </a:rPr>
+              <a:t>, you still have to be careful that you might get some data. This caused a lot of subtle bugs.</a:t>
+            </a:r>
+          </a:p>
+          <a:p>
+            <a:endParaRPr lang="en-US" baseline="0" dirty="0" smtClean="0"/>
+          </a:p>
+          <a:p>
+            <a:endParaRPr lang="en-US" baseline="0" dirty="0" smtClean="0"/>
+          </a:p>
+          <a:p>
             <a:endParaRPr lang="en-US" dirty="0"/>
           </a:p>
         </p:txBody>
@@ -2803,7 +2934,7 @@
             </a:r>
             <a:r>
               <a:rPr lang="en-US" dirty="0" smtClean="0"/>
-              <a:t> effort around the stream handbook.  </a:t>
+              <a:t> effort around the stream handbook.  Also check out is spec-stream.</a:t>
             </a:r>
             <a:endParaRPr lang="en-US" dirty="0"/>
           </a:p>
@@ -3878,7 +4009,7 @@
           </a:p>
           <a:p>
             <a:r>
-              <a:rPr lang="en-US" baseline="0" smtClean="0"/>
+              <a:rPr lang="en-US" baseline="0" dirty="0" smtClean="0"/>
               <a:t>DEMO: Hello.js</a:t>
             </a:r>
             <a:endParaRPr lang="en-US" dirty="0"/>
@@ -9320,7 +9451,47 @@
                 <a:latin typeface="Consolas" panose="020B0609020204030204" pitchFamily="49" charset="0"/>
                 <a:cs typeface="Consolas" panose="020B0609020204030204" pitchFamily="49" charset="0"/>
               </a:rPr>
-              <a:t>, function () {</a:t>
+              <a:t>, function </a:t>
+            </a:r>
+            <a:r>
+              <a:rPr lang="en-US" sz="2200" b="1" dirty="0" smtClean="0">
+                <a:solidFill>
+                  <a:schemeClr val="bg1"/>
+                </a:solidFill>
+                <a:latin typeface="Consolas" panose="020B0609020204030204" pitchFamily="49" charset="0"/>
+                <a:cs typeface="Consolas" panose="020B0609020204030204" pitchFamily="49" charset="0"/>
+              </a:rPr>
+              <a:t>(</a:t>
+            </a:r>
+            <a:r>
+              <a:rPr lang="en-US" sz="2200" b="1" dirty="0" smtClean="0">
+                <a:solidFill>
+                  <a:srgbClr val="FD971F"/>
+                </a:solidFill>
+                <a:latin typeface="Consolas" panose="020B0609020204030204" pitchFamily="49" charset="0"/>
+                <a:cs typeface="Consolas" panose="020B0609020204030204" pitchFamily="49" charset="0"/>
+              </a:rPr>
+              <a:t>err</a:t>
+            </a:r>
+            <a:r>
+              <a:rPr lang="en-US" sz="2200" b="1" dirty="0" smtClean="0">
+                <a:solidFill>
+                  <a:schemeClr val="bg1"/>
+                </a:solidFill>
+                <a:latin typeface="Consolas" panose="020B0609020204030204" pitchFamily="49" charset="0"/>
+                <a:cs typeface="Consolas" panose="020B0609020204030204" pitchFamily="49" charset="0"/>
+              </a:rPr>
+              <a:t>) </a:t>
+            </a:r>
+            <a:r>
+              <a:rPr lang="en-US" sz="2200" b="1" dirty="0">
+                <a:solidFill>
+                  <a:schemeClr val="bg1"/>
+                </a:solidFill>
+                <a:latin typeface="Consolas" panose="020B0609020204030204" pitchFamily="49" charset="0"/>
+                <a:cs typeface="Consolas" panose="020B0609020204030204" pitchFamily="49" charset="0"/>
+              </a:rPr>
+              <a:t>{</a:t>
             </a:r>
           </a:p>
           <a:p>
@@ -10644,8 +10815,45 @@
                 <a:latin typeface="Consolas" panose="020B0609020204030204" pitchFamily="49" charset="0"/>
                 <a:cs typeface="Consolas" panose="020B0609020204030204" pitchFamily="49" charset="0"/>
               </a:rPr>
-              <a:t>, count);</a:t>
-            </a:r>
+              <a:t>, </a:t>
+            </a:r>
+            <a:r>
+              <a:rPr lang="en-US" sz="2000" b="1" dirty="0" smtClean="0">
+                <a:solidFill>
+                  <a:schemeClr val="bg1"/>
+                </a:solidFill>
+                <a:latin typeface="Consolas" panose="020B0609020204030204" pitchFamily="49" charset="0"/>
+                <a:cs typeface="Consolas" panose="020B0609020204030204" pitchFamily="49" charset="0"/>
+              </a:rPr>
+              <a:t>count + </a:t>
+            </a:r>
+            <a:r>
+              <a:rPr lang="en-US" sz="2000" b="1" dirty="0" smtClean="0">
+                <a:solidFill>
+                  <a:srgbClr val="E6DB74"/>
+                </a:solidFill>
+                <a:latin typeface="Consolas" panose="020B0609020204030204" pitchFamily="49" charset="0"/>
+                <a:cs typeface="Consolas" panose="020B0609020204030204" pitchFamily="49" charset="0"/>
+              </a:rPr>
+              <a:t>'\n'</a:t>
+            </a:r>
+            <a:r>
+              <a:rPr lang="en-US" sz="2000" b="1" dirty="0" smtClean="0">
+                <a:solidFill>
+                  <a:schemeClr val="bg1"/>
+                </a:solidFill>
+                <a:latin typeface="Consolas" panose="020B0609020204030204" pitchFamily="49" charset="0"/>
+                <a:cs typeface="Consolas" panose="020B0609020204030204" pitchFamily="49" charset="0"/>
+              </a:rPr>
+              <a:t>);</a:t>
+            </a:r>
+            <a:endParaRPr lang="en-US" sz="2000" b="1" dirty="0">
+              <a:solidFill>
+                <a:schemeClr val="bg1"/>
+              </a:solidFill>
+              <a:latin typeface="Consolas" panose="020B0609020204030204" pitchFamily="49" charset="0"/>
+              <a:cs typeface="Consolas" panose="020B0609020204030204" pitchFamily="49" charset="0"/>
+            </a:endParaRPr>
           </a:p>
           <a:p>
             <a:r>
@@ -12561,7 +12769,27 @@
                 <a:latin typeface="Consolas" panose="020B0609020204030204" pitchFamily="49" charset="0"/>
                 <a:cs typeface="Consolas" panose="020B0609020204030204" pitchFamily="49" charset="0"/>
               </a:rPr>
-              <a:t>emit('end')</a:t>
+              <a:t>emit(</a:t>
+            </a:r>
+            <a:r>
+              <a:rPr lang="en-US" dirty="0">
+                <a:solidFill>
+                  <a:srgbClr val="E6DB74"/>
+                </a:solidFill>
+                <a:latin typeface="Consolas" panose="020B0609020204030204" pitchFamily="49" charset="0"/>
+                <a:cs typeface="Consolas" panose="020B0609020204030204" pitchFamily="49" charset="0"/>
+              </a:rPr>
+              <a:t>'end'</a:t>
+            </a:r>
+            <a:r>
+              <a:rPr lang="en-US" dirty="0">
+                <a:solidFill>
+                  <a:schemeClr val="bg1"/>
+                </a:solidFill>
+                <a:latin typeface="Consolas" panose="020B0609020204030204" pitchFamily="49" charset="0"/>
+                <a:cs typeface="Consolas" panose="020B0609020204030204" pitchFamily="49" charset="0"/>
+              </a:rPr>
+              <a:t>)</a:t>
             </a:r>
           </a:p>
           <a:p>

</xml_diff>